<commit_message>
updated images: bidirectional arrows updated Kajimoto-san's afiliation adding definition for proxy
</commit_message>
<xml_diff>
--- a/images/wot-use-cases/wot-use-cases-large.pptx
+++ b/images/wot-use-cases/wot-use-cases-large.pptx
@@ -119,7 +119,7 @@
   </p:defaultTextStyle>
   <p:extLst>
     <p:ext uri="{EFAFB233-063F-42B5-8137-9DF3F51BA10A}">
-      <p15:sldGuideLst xmlns:p15="http://schemas.microsoft.com/office/powerpoint/2012/main" xmlns="">
+      <p15:sldGuideLst xmlns:p15="http://schemas.microsoft.com/office/powerpoint/2012/main">
         <p15:guide id="1" orient="horz" pos="2160">
           <p15:clr>
             <a:srgbClr val="A4A3A4"/>
@@ -318,7 +318,7 @@
             <a:fld id="{D15E2E9D-520B-4AF5-9F19-1A682015C815}" type="datetimeFigureOut">
               <a:rPr kumimoji="1" lang="ja-JP" altLang="en-US" smtClean="0"/>
               <a:pPr/>
-              <a:t>11.03.19</a:t>
+              <a:t>2019/4/9</a:t>
             </a:fld>
             <a:endParaRPr kumimoji="1" lang="ja-JP" altLang="en-US"/>
           </a:p>
@@ -490,7 +490,7 @@
             <a:fld id="{D15E2E9D-520B-4AF5-9F19-1A682015C815}" type="datetimeFigureOut">
               <a:rPr kumimoji="1" lang="ja-JP" altLang="en-US" smtClean="0"/>
               <a:pPr/>
-              <a:t>11.03.19</a:t>
+              <a:t>2019/4/9</a:t>
             </a:fld>
             <a:endParaRPr kumimoji="1" lang="ja-JP" altLang="en-US"/>
           </a:p>
@@ -672,7 +672,7 @@
             <a:fld id="{D15E2E9D-520B-4AF5-9F19-1A682015C815}" type="datetimeFigureOut">
               <a:rPr kumimoji="1" lang="ja-JP" altLang="en-US" smtClean="0"/>
               <a:pPr/>
-              <a:t>11.03.19</a:t>
+              <a:t>2019/4/9</a:t>
             </a:fld>
             <a:endParaRPr kumimoji="1" lang="ja-JP" altLang="en-US"/>
           </a:p>
@@ -844,7 +844,7 @@
             <a:fld id="{D15E2E9D-520B-4AF5-9F19-1A682015C815}" type="datetimeFigureOut">
               <a:rPr kumimoji="1" lang="ja-JP" altLang="en-US" smtClean="0"/>
               <a:pPr/>
-              <a:t>11.03.19</a:t>
+              <a:t>2019/4/9</a:t>
             </a:fld>
             <a:endParaRPr kumimoji="1" lang="ja-JP" altLang="en-US"/>
           </a:p>
@@ -1092,7 +1092,7 @@
             <a:fld id="{D15E2E9D-520B-4AF5-9F19-1A682015C815}" type="datetimeFigureOut">
               <a:rPr kumimoji="1" lang="ja-JP" altLang="en-US" smtClean="0"/>
               <a:pPr/>
-              <a:t>11.03.19</a:t>
+              <a:t>2019/4/9</a:t>
             </a:fld>
             <a:endParaRPr kumimoji="1" lang="ja-JP" altLang="en-US"/>
           </a:p>
@@ -1382,7 +1382,7 @@
             <a:fld id="{D15E2E9D-520B-4AF5-9F19-1A682015C815}" type="datetimeFigureOut">
               <a:rPr kumimoji="1" lang="ja-JP" altLang="en-US" smtClean="0"/>
               <a:pPr/>
-              <a:t>11.03.19</a:t>
+              <a:t>2019/4/9</a:t>
             </a:fld>
             <a:endParaRPr kumimoji="1" lang="ja-JP" altLang="en-US"/>
           </a:p>
@@ -1806,7 +1806,7 @@
             <a:fld id="{D15E2E9D-520B-4AF5-9F19-1A682015C815}" type="datetimeFigureOut">
               <a:rPr kumimoji="1" lang="ja-JP" altLang="en-US" smtClean="0"/>
               <a:pPr/>
-              <a:t>11.03.19</a:t>
+              <a:t>2019/4/9</a:t>
             </a:fld>
             <a:endParaRPr kumimoji="1" lang="ja-JP" altLang="en-US"/>
           </a:p>
@@ -1926,7 +1926,7 @@
             <a:fld id="{D15E2E9D-520B-4AF5-9F19-1A682015C815}" type="datetimeFigureOut">
               <a:rPr kumimoji="1" lang="ja-JP" altLang="en-US" smtClean="0"/>
               <a:pPr/>
-              <a:t>11.03.19</a:t>
+              <a:t>2019/4/9</a:t>
             </a:fld>
             <a:endParaRPr kumimoji="1" lang="ja-JP" altLang="en-US"/>
           </a:p>
@@ -2023,7 +2023,7 @@
             <a:fld id="{D15E2E9D-520B-4AF5-9F19-1A682015C815}" type="datetimeFigureOut">
               <a:rPr kumimoji="1" lang="ja-JP" altLang="en-US" smtClean="0"/>
               <a:pPr/>
-              <a:t>11.03.19</a:t>
+              <a:t>2019/4/9</a:t>
             </a:fld>
             <a:endParaRPr kumimoji="1" lang="ja-JP" altLang="en-US"/>
           </a:p>
@@ -2302,7 +2302,7 @@
             <a:fld id="{D15E2E9D-520B-4AF5-9F19-1A682015C815}" type="datetimeFigureOut">
               <a:rPr kumimoji="1" lang="ja-JP" altLang="en-US" smtClean="0"/>
               <a:pPr/>
-              <a:t>11.03.19</a:t>
+              <a:t>2019/4/9</a:t>
             </a:fld>
             <a:endParaRPr kumimoji="1" lang="ja-JP" altLang="en-US"/>
           </a:p>
@@ -2557,7 +2557,7 @@
             <a:fld id="{D15E2E9D-520B-4AF5-9F19-1A682015C815}" type="datetimeFigureOut">
               <a:rPr kumimoji="1" lang="ja-JP" altLang="en-US" smtClean="0"/>
               <a:pPr/>
-              <a:t>11.03.19</a:t>
+              <a:t>2019/4/9</a:t>
             </a:fld>
             <a:endParaRPr kumimoji="1" lang="ja-JP" altLang="en-US"/>
           </a:p>
@@ -2772,7 +2772,7 @@
             <a:fld id="{D15E2E9D-520B-4AF5-9F19-1A682015C815}" type="datetimeFigureOut">
               <a:rPr kumimoji="1" lang="ja-JP" altLang="en-US" smtClean="0"/>
               <a:pPr/>
-              <a:t>11.03.19</a:t>
+              <a:t>2019/4/9</a:t>
             </a:fld>
             <a:endParaRPr kumimoji="1" lang="ja-JP" altLang="en-US"/>
           </a:p>
@@ -3379,7 +3379,7 @@
           <p:cNvPr id="10" name="テキスト ボックス 18">
             <a:extLst>
               <a:ext uri="{FF2B5EF4-FFF2-40B4-BE49-F238E27FC236}">
-                <a16:creationId xmlns:a16="http://schemas.microsoft.com/office/drawing/2014/main" xmlns="" id="{8FF2E807-8B8E-C743-A198-DE8D9FE0B353}"/>
+                <a16:creationId xmlns:a16="http://schemas.microsoft.com/office/drawing/2014/main" id="{8FF2E807-8B8E-C743-A198-DE8D9FE0B353}"/>
               </a:ext>
             </a:extLst>
           </p:cNvPr>
@@ -3530,7 +3530,8 @@
             <a:avLst/>
           </a:prstGeom>
           <a:ln>
-            <a:tailEnd type="arrow"/>
+            <a:headEnd type="arrow" w="med" len="med"/>
+            <a:tailEnd type="arrow" w="med" len="med"/>
           </a:ln>
         </p:spPr>
         <p:style>
@@ -3663,7 +3664,8 @@
             <a:avLst/>
           </a:prstGeom>
           <a:ln>
-            <a:tailEnd type="arrow"/>
+            <a:headEnd type="arrow" w="med" len="med"/>
+            <a:tailEnd type="arrow" w="med" len="med"/>
           </a:ln>
         </p:spPr>
         <p:style>
@@ -3686,7 +3688,7 @@
           <p:cNvPr id="20" name="テキスト ボックス 18">
             <a:extLst>
               <a:ext uri="{FF2B5EF4-FFF2-40B4-BE49-F238E27FC236}">
-                <a16:creationId xmlns:a16="http://schemas.microsoft.com/office/drawing/2014/main" xmlns="" id="{1BABC55C-975E-6846-985C-88584B52D21F}"/>
+                <a16:creationId xmlns:a16="http://schemas.microsoft.com/office/drawing/2014/main" id="{1BABC55C-975E-6846-985C-88584B52D21F}"/>
               </a:ext>
             </a:extLst>
           </p:cNvPr>
@@ -3723,7 +3725,7 @@
           <p:cNvPr id="3" name="Oval 2">
             <a:extLst>
               <a:ext uri="{FF2B5EF4-FFF2-40B4-BE49-F238E27FC236}">
-                <a16:creationId xmlns:a16="http://schemas.microsoft.com/office/drawing/2014/main" xmlns="" id="{F23D0E80-999F-1541-A5F6-6BBF0C95A4C5}"/>
+                <a16:creationId xmlns:a16="http://schemas.microsoft.com/office/drawing/2014/main" id="{F23D0E80-999F-1541-A5F6-6BBF0C95A4C5}"/>
               </a:ext>
             </a:extLst>
           </p:cNvPr>
@@ -3769,7 +3771,7 @@
           <p:cNvPr id="25" name="Oval 24">
             <a:extLst>
               <a:ext uri="{FF2B5EF4-FFF2-40B4-BE49-F238E27FC236}">
-                <a16:creationId xmlns:a16="http://schemas.microsoft.com/office/drawing/2014/main" xmlns="" id="{3D400183-EBD7-8543-BD63-433B580A26EB}"/>
+                <a16:creationId xmlns:a16="http://schemas.microsoft.com/office/drawing/2014/main" id="{3D400183-EBD7-8543-BD63-433B580A26EB}"/>
               </a:ext>
             </a:extLst>
           </p:cNvPr>
@@ -3815,7 +3817,7 @@
           <p:cNvPr id="28" name="Oval 27">
             <a:extLst>
               <a:ext uri="{FF2B5EF4-FFF2-40B4-BE49-F238E27FC236}">
-                <a16:creationId xmlns:a16="http://schemas.microsoft.com/office/drawing/2014/main" xmlns="" id="{D2E8EC0D-77EA-EF45-888C-45592064E80E}"/>
+                <a16:creationId xmlns:a16="http://schemas.microsoft.com/office/drawing/2014/main" id="{D2E8EC0D-77EA-EF45-888C-45592064E80E}"/>
               </a:ext>
             </a:extLst>
           </p:cNvPr>
@@ -3861,7 +3863,7 @@
           <p:cNvPr id="29" name="Oval 28">
             <a:extLst>
               <a:ext uri="{FF2B5EF4-FFF2-40B4-BE49-F238E27FC236}">
-                <a16:creationId xmlns:a16="http://schemas.microsoft.com/office/drawing/2014/main" xmlns="" id="{FAAC52EC-CA61-844C-BFEC-FD01C27DCB59}"/>
+                <a16:creationId xmlns:a16="http://schemas.microsoft.com/office/drawing/2014/main" id="{FAAC52EC-CA61-844C-BFEC-FD01C27DCB59}"/>
               </a:ext>
             </a:extLst>
           </p:cNvPr>
@@ -3907,7 +3909,7 @@
           <p:cNvPr id="30" name="Oval 29">
             <a:extLst>
               <a:ext uri="{FF2B5EF4-FFF2-40B4-BE49-F238E27FC236}">
-                <a16:creationId xmlns:a16="http://schemas.microsoft.com/office/drawing/2014/main" xmlns="" id="{E1B6F3D0-C69A-5A4C-BA4C-AC839758A2C7}"/>
+                <a16:creationId xmlns:a16="http://schemas.microsoft.com/office/drawing/2014/main" id="{E1B6F3D0-C69A-5A4C-BA4C-AC839758A2C7}"/>
               </a:ext>
             </a:extLst>
           </p:cNvPr>
@@ -3953,7 +3955,7 @@
           <p:cNvPr id="5" name="Straight Connector 4">
             <a:extLst>
               <a:ext uri="{FF2B5EF4-FFF2-40B4-BE49-F238E27FC236}">
-                <a16:creationId xmlns:a16="http://schemas.microsoft.com/office/drawing/2014/main" xmlns="" id="{BE538986-3A1C-E34A-9C72-DC4DEEB9D1FC}"/>
+                <a16:creationId xmlns:a16="http://schemas.microsoft.com/office/drawing/2014/main" id="{BE538986-3A1C-E34A-9C72-DC4DEEB9D1FC}"/>
               </a:ext>
             </a:extLst>
           </p:cNvPr>
@@ -3993,7 +3995,7 @@
           <p:cNvPr id="9" name="Straight Connector 8">
             <a:extLst>
               <a:ext uri="{FF2B5EF4-FFF2-40B4-BE49-F238E27FC236}">
-                <a16:creationId xmlns:a16="http://schemas.microsoft.com/office/drawing/2014/main" xmlns="" id="{BD5BF377-A61B-6F40-BC3D-41BA7E5C3680}"/>
+                <a16:creationId xmlns:a16="http://schemas.microsoft.com/office/drawing/2014/main" id="{BD5BF377-A61B-6F40-BC3D-41BA7E5C3680}"/>
               </a:ext>
             </a:extLst>
           </p:cNvPr>
@@ -4032,7 +4034,7 @@
           <p:cNvPr id="12" name="Straight Connector 11">
             <a:extLst>
               <a:ext uri="{FF2B5EF4-FFF2-40B4-BE49-F238E27FC236}">
-                <a16:creationId xmlns:a16="http://schemas.microsoft.com/office/drawing/2014/main" xmlns="" id="{931CAE2B-3739-E749-AFC3-8FF0F5318057}"/>
+                <a16:creationId xmlns:a16="http://schemas.microsoft.com/office/drawing/2014/main" id="{931CAE2B-3739-E749-AFC3-8FF0F5318057}"/>
               </a:ext>
             </a:extLst>
           </p:cNvPr>
@@ -4072,7 +4074,7 @@
           <p:cNvPr id="33" name="Straight Connector 32">
             <a:extLst>
               <a:ext uri="{FF2B5EF4-FFF2-40B4-BE49-F238E27FC236}">
-                <a16:creationId xmlns:a16="http://schemas.microsoft.com/office/drawing/2014/main" xmlns="" id="{575FB9A1-2A60-0440-87E9-9EF358ED596C}"/>
+                <a16:creationId xmlns:a16="http://schemas.microsoft.com/office/drawing/2014/main" id="{575FB9A1-2A60-0440-87E9-9EF358ED596C}"/>
               </a:ext>
             </a:extLst>
           </p:cNvPr>
@@ -4111,7 +4113,7 @@
           <p:cNvPr id="35" name="Straight Connector 34">
             <a:extLst>
               <a:ext uri="{FF2B5EF4-FFF2-40B4-BE49-F238E27FC236}">
-                <a16:creationId xmlns:a16="http://schemas.microsoft.com/office/drawing/2014/main" xmlns="" id="{88A1850E-CD69-1649-A05E-8AFBAA505FD7}"/>
+                <a16:creationId xmlns:a16="http://schemas.microsoft.com/office/drawing/2014/main" id="{88A1850E-CD69-1649-A05E-8AFBAA505FD7}"/>
               </a:ext>
             </a:extLst>
           </p:cNvPr>
@@ -4150,7 +4152,7 @@
           <p:cNvPr id="40" name="Straight Connector 39">
             <a:extLst>
               <a:ext uri="{FF2B5EF4-FFF2-40B4-BE49-F238E27FC236}">
-                <a16:creationId xmlns:a16="http://schemas.microsoft.com/office/drawing/2014/main" xmlns="" id="{85936ABA-53DB-7541-A3A9-B326378109BB}"/>
+                <a16:creationId xmlns:a16="http://schemas.microsoft.com/office/drawing/2014/main" id="{85936ABA-53DB-7541-A3A9-B326378109BB}"/>
               </a:ext>
             </a:extLst>
           </p:cNvPr>
@@ -4189,7 +4191,7 @@
           <p:cNvPr id="42" name="直線矢印コネクタ 17">
             <a:extLst>
               <a:ext uri="{FF2B5EF4-FFF2-40B4-BE49-F238E27FC236}">
-                <a16:creationId xmlns:a16="http://schemas.microsoft.com/office/drawing/2014/main" xmlns="" id="{B5342E1A-177F-CD4A-95C3-440FC11D1ADA}"/>
+                <a16:creationId xmlns:a16="http://schemas.microsoft.com/office/drawing/2014/main" id="{B5342E1A-177F-CD4A-95C3-440FC11D1ADA}"/>
               </a:ext>
             </a:extLst>
           </p:cNvPr>
@@ -4278,7 +4280,7 @@
           <p:cNvPr id="57" name="正方形/長方形 17">
             <a:extLst>
               <a:ext uri="{FF2B5EF4-FFF2-40B4-BE49-F238E27FC236}">
-                <a16:creationId xmlns:a16="http://schemas.microsoft.com/office/drawing/2014/main" xmlns="" id="{130B3935-1247-3348-8096-94B45ADA2C4F}"/>
+                <a16:creationId xmlns:a16="http://schemas.microsoft.com/office/drawing/2014/main" id="{130B3935-1247-3348-8096-94B45ADA2C4F}"/>
               </a:ext>
             </a:extLst>
           </p:cNvPr>
@@ -4386,7 +4388,7 @@
           <p:cNvPr id="58" name="Group 57">
             <a:extLst>
               <a:ext uri="{FF2B5EF4-FFF2-40B4-BE49-F238E27FC236}">
-                <a16:creationId xmlns:a16="http://schemas.microsoft.com/office/drawing/2014/main" xmlns="" id="{1122A44C-DC11-CA43-AAB9-934279EF613C}"/>
+                <a16:creationId xmlns:a16="http://schemas.microsoft.com/office/drawing/2014/main" id="{1122A44C-DC11-CA43-AAB9-934279EF613C}"/>
               </a:ext>
             </a:extLst>
           </p:cNvPr>
@@ -4406,7 +4408,7 @@
             <p:cNvPr id="59" name="Oval 58">
               <a:extLst>
                 <a:ext uri="{FF2B5EF4-FFF2-40B4-BE49-F238E27FC236}">
-                  <a16:creationId xmlns:a16="http://schemas.microsoft.com/office/drawing/2014/main" xmlns="" id="{1AC815EF-350D-6F45-BCCD-E2241D4A81AE}"/>
+                  <a16:creationId xmlns:a16="http://schemas.microsoft.com/office/drawing/2014/main" id="{1AC815EF-350D-6F45-BCCD-E2241D4A81AE}"/>
                 </a:ext>
               </a:extLst>
             </p:cNvPr>
@@ -4452,7 +4454,7 @@
             <p:cNvPr id="60" name="Oval 59">
               <a:extLst>
                 <a:ext uri="{FF2B5EF4-FFF2-40B4-BE49-F238E27FC236}">
-                  <a16:creationId xmlns:a16="http://schemas.microsoft.com/office/drawing/2014/main" xmlns="" id="{688CB2FF-E17D-6B45-A615-DD1CE4CF8524}"/>
+                  <a16:creationId xmlns:a16="http://schemas.microsoft.com/office/drawing/2014/main" id="{688CB2FF-E17D-6B45-A615-DD1CE4CF8524}"/>
                 </a:ext>
               </a:extLst>
             </p:cNvPr>
@@ -4498,7 +4500,7 @@
             <p:cNvPr id="61" name="Oval 60">
               <a:extLst>
                 <a:ext uri="{FF2B5EF4-FFF2-40B4-BE49-F238E27FC236}">
-                  <a16:creationId xmlns:a16="http://schemas.microsoft.com/office/drawing/2014/main" xmlns="" id="{26E520C9-124A-AB42-AC17-4C557C0B1892}"/>
+                  <a16:creationId xmlns:a16="http://schemas.microsoft.com/office/drawing/2014/main" id="{26E520C9-124A-AB42-AC17-4C557C0B1892}"/>
                 </a:ext>
               </a:extLst>
             </p:cNvPr>
@@ -4544,7 +4546,7 @@
             <p:cNvPr id="62" name="Oval 61">
               <a:extLst>
                 <a:ext uri="{FF2B5EF4-FFF2-40B4-BE49-F238E27FC236}">
-                  <a16:creationId xmlns:a16="http://schemas.microsoft.com/office/drawing/2014/main" xmlns="" id="{D5129498-28A3-D649-B52F-8D571E7DC550}"/>
+                  <a16:creationId xmlns:a16="http://schemas.microsoft.com/office/drawing/2014/main" id="{D5129498-28A3-D649-B52F-8D571E7DC550}"/>
                 </a:ext>
               </a:extLst>
             </p:cNvPr>
@@ -4590,7 +4592,7 @@
             <p:cNvPr id="63" name="Oval 62">
               <a:extLst>
                 <a:ext uri="{FF2B5EF4-FFF2-40B4-BE49-F238E27FC236}">
-                  <a16:creationId xmlns:a16="http://schemas.microsoft.com/office/drawing/2014/main" xmlns="" id="{70A70BE7-7284-2142-B14C-E538299F3475}"/>
+                  <a16:creationId xmlns:a16="http://schemas.microsoft.com/office/drawing/2014/main" id="{70A70BE7-7284-2142-B14C-E538299F3475}"/>
                 </a:ext>
               </a:extLst>
             </p:cNvPr>
@@ -4636,7 +4638,7 @@
             <p:cNvPr id="64" name="Straight Connector 63">
               <a:extLst>
                 <a:ext uri="{FF2B5EF4-FFF2-40B4-BE49-F238E27FC236}">
-                  <a16:creationId xmlns:a16="http://schemas.microsoft.com/office/drawing/2014/main" xmlns="" id="{A6AC5435-4154-9247-86BE-33A7078000C7}"/>
+                  <a16:creationId xmlns:a16="http://schemas.microsoft.com/office/drawing/2014/main" id="{A6AC5435-4154-9247-86BE-33A7078000C7}"/>
                 </a:ext>
               </a:extLst>
             </p:cNvPr>
@@ -4676,7 +4678,7 @@
             <p:cNvPr id="65" name="Straight Connector 64">
               <a:extLst>
                 <a:ext uri="{FF2B5EF4-FFF2-40B4-BE49-F238E27FC236}">
-                  <a16:creationId xmlns:a16="http://schemas.microsoft.com/office/drawing/2014/main" xmlns="" id="{231C7164-9912-9E4F-A64F-01D94572A9EF}"/>
+                  <a16:creationId xmlns:a16="http://schemas.microsoft.com/office/drawing/2014/main" id="{231C7164-9912-9E4F-A64F-01D94572A9EF}"/>
                 </a:ext>
               </a:extLst>
             </p:cNvPr>
@@ -4715,7 +4717,7 @@
             <p:cNvPr id="66" name="Straight Connector 65">
               <a:extLst>
                 <a:ext uri="{FF2B5EF4-FFF2-40B4-BE49-F238E27FC236}">
-                  <a16:creationId xmlns:a16="http://schemas.microsoft.com/office/drawing/2014/main" xmlns="" id="{1A6B4F5F-7A36-8143-9249-47E02A5B4934}"/>
+                  <a16:creationId xmlns:a16="http://schemas.microsoft.com/office/drawing/2014/main" id="{1A6B4F5F-7A36-8143-9249-47E02A5B4934}"/>
                 </a:ext>
               </a:extLst>
             </p:cNvPr>
@@ -4755,7 +4757,7 @@
             <p:cNvPr id="67" name="Straight Connector 66">
               <a:extLst>
                 <a:ext uri="{FF2B5EF4-FFF2-40B4-BE49-F238E27FC236}">
-                  <a16:creationId xmlns:a16="http://schemas.microsoft.com/office/drawing/2014/main" xmlns="" id="{16051331-1194-A043-83BE-29C603BF44F4}"/>
+                  <a16:creationId xmlns:a16="http://schemas.microsoft.com/office/drawing/2014/main" id="{16051331-1194-A043-83BE-29C603BF44F4}"/>
                 </a:ext>
               </a:extLst>
             </p:cNvPr>
@@ -4794,7 +4796,7 @@
             <p:cNvPr id="68" name="Straight Connector 67">
               <a:extLst>
                 <a:ext uri="{FF2B5EF4-FFF2-40B4-BE49-F238E27FC236}">
-                  <a16:creationId xmlns:a16="http://schemas.microsoft.com/office/drawing/2014/main" xmlns="" id="{772F3E67-FAA9-A54E-8084-35529CE58F05}"/>
+                  <a16:creationId xmlns:a16="http://schemas.microsoft.com/office/drawing/2014/main" id="{772F3E67-FAA9-A54E-8084-35529CE58F05}"/>
                 </a:ext>
               </a:extLst>
             </p:cNvPr>
@@ -4833,7 +4835,7 @@
             <p:cNvPr id="69" name="Straight Connector 68">
               <a:extLst>
                 <a:ext uri="{FF2B5EF4-FFF2-40B4-BE49-F238E27FC236}">
-                  <a16:creationId xmlns:a16="http://schemas.microsoft.com/office/drawing/2014/main" xmlns="" id="{39E82FE7-2144-914E-B2ED-620F8FB1ECCC}"/>
+                  <a16:creationId xmlns:a16="http://schemas.microsoft.com/office/drawing/2014/main" id="{39E82FE7-2144-914E-B2ED-620F8FB1ECCC}"/>
                 </a:ext>
               </a:extLst>
             </p:cNvPr>
@@ -5087,7 +5089,8 @@
             <a:avLst/>
           </a:prstGeom>
           <a:ln>
-            <a:tailEnd type="arrow"/>
+            <a:headEnd type="arrow" w="med" len="med"/>
+            <a:tailEnd type="arrow" w="med" len="med"/>
           </a:ln>
         </p:spPr>
         <p:style>
@@ -5334,7 +5337,8 @@
             <a:avLst/>
           </a:prstGeom>
           <a:ln>
-            <a:tailEnd type="arrow"/>
+            <a:headEnd type="arrow" w="med" len="med"/>
+            <a:tailEnd type="arrow" w="med" len="med"/>
           </a:ln>
         </p:spPr>
         <p:style>
@@ -5357,7 +5361,7 @@
           <p:cNvPr id="20" name="テキスト ボックス 18">
             <a:extLst>
               <a:ext uri="{FF2B5EF4-FFF2-40B4-BE49-F238E27FC236}">
-                <a16:creationId xmlns:a16="http://schemas.microsoft.com/office/drawing/2014/main" xmlns="" id="{1BABC55C-975E-6846-985C-88584B52D21F}"/>
+                <a16:creationId xmlns:a16="http://schemas.microsoft.com/office/drawing/2014/main" id="{1BABC55C-975E-6846-985C-88584B52D21F}"/>
               </a:ext>
             </a:extLst>
           </p:cNvPr>
@@ -5394,7 +5398,7 @@
           <p:cNvPr id="3" name="Oval 2">
             <a:extLst>
               <a:ext uri="{FF2B5EF4-FFF2-40B4-BE49-F238E27FC236}">
-                <a16:creationId xmlns:a16="http://schemas.microsoft.com/office/drawing/2014/main" xmlns="" id="{F23D0E80-999F-1541-A5F6-6BBF0C95A4C5}"/>
+                <a16:creationId xmlns:a16="http://schemas.microsoft.com/office/drawing/2014/main" id="{F23D0E80-999F-1541-A5F6-6BBF0C95A4C5}"/>
               </a:ext>
             </a:extLst>
           </p:cNvPr>
@@ -5440,7 +5444,7 @@
           <p:cNvPr id="25" name="Oval 24">
             <a:extLst>
               <a:ext uri="{FF2B5EF4-FFF2-40B4-BE49-F238E27FC236}">
-                <a16:creationId xmlns:a16="http://schemas.microsoft.com/office/drawing/2014/main" xmlns="" id="{3D400183-EBD7-8543-BD63-433B580A26EB}"/>
+                <a16:creationId xmlns:a16="http://schemas.microsoft.com/office/drawing/2014/main" id="{3D400183-EBD7-8543-BD63-433B580A26EB}"/>
               </a:ext>
             </a:extLst>
           </p:cNvPr>
@@ -5486,7 +5490,7 @@
           <p:cNvPr id="28" name="Oval 27">
             <a:extLst>
               <a:ext uri="{FF2B5EF4-FFF2-40B4-BE49-F238E27FC236}">
-                <a16:creationId xmlns:a16="http://schemas.microsoft.com/office/drawing/2014/main" xmlns="" id="{D2E8EC0D-77EA-EF45-888C-45592064E80E}"/>
+                <a16:creationId xmlns:a16="http://schemas.microsoft.com/office/drawing/2014/main" id="{D2E8EC0D-77EA-EF45-888C-45592064E80E}"/>
               </a:ext>
             </a:extLst>
           </p:cNvPr>
@@ -5532,7 +5536,7 @@
           <p:cNvPr id="29" name="Oval 28">
             <a:extLst>
               <a:ext uri="{FF2B5EF4-FFF2-40B4-BE49-F238E27FC236}">
-                <a16:creationId xmlns:a16="http://schemas.microsoft.com/office/drawing/2014/main" xmlns="" id="{FAAC52EC-CA61-844C-BFEC-FD01C27DCB59}"/>
+                <a16:creationId xmlns:a16="http://schemas.microsoft.com/office/drawing/2014/main" id="{FAAC52EC-CA61-844C-BFEC-FD01C27DCB59}"/>
               </a:ext>
             </a:extLst>
           </p:cNvPr>
@@ -5578,7 +5582,7 @@
           <p:cNvPr id="30" name="Oval 29">
             <a:extLst>
               <a:ext uri="{FF2B5EF4-FFF2-40B4-BE49-F238E27FC236}">
-                <a16:creationId xmlns:a16="http://schemas.microsoft.com/office/drawing/2014/main" xmlns="" id="{E1B6F3D0-C69A-5A4C-BA4C-AC839758A2C7}"/>
+                <a16:creationId xmlns:a16="http://schemas.microsoft.com/office/drawing/2014/main" id="{E1B6F3D0-C69A-5A4C-BA4C-AC839758A2C7}"/>
               </a:ext>
             </a:extLst>
           </p:cNvPr>
@@ -5624,7 +5628,7 @@
           <p:cNvPr id="5" name="Straight Connector 4">
             <a:extLst>
               <a:ext uri="{FF2B5EF4-FFF2-40B4-BE49-F238E27FC236}">
-                <a16:creationId xmlns:a16="http://schemas.microsoft.com/office/drawing/2014/main" xmlns="" id="{BE538986-3A1C-E34A-9C72-DC4DEEB9D1FC}"/>
+                <a16:creationId xmlns:a16="http://schemas.microsoft.com/office/drawing/2014/main" id="{BE538986-3A1C-E34A-9C72-DC4DEEB9D1FC}"/>
               </a:ext>
             </a:extLst>
           </p:cNvPr>
@@ -5664,7 +5668,7 @@
           <p:cNvPr id="9" name="Straight Connector 8">
             <a:extLst>
               <a:ext uri="{FF2B5EF4-FFF2-40B4-BE49-F238E27FC236}">
-                <a16:creationId xmlns:a16="http://schemas.microsoft.com/office/drawing/2014/main" xmlns="" id="{BD5BF377-A61B-6F40-BC3D-41BA7E5C3680}"/>
+                <a16:creationId xmlns:a16="http://schemas.microsoft.com/office/drawing/2014/main" id="{BD5BF377-A61B-6F40-BC3D-41BA7E5C3680}"/>
               </a:ext>
             </a:extLst>
           </p:cNvPr>
@@ -5703,7 +5707,7 @@
           <p:cNvPr id="12" name="Straight Connector 11">
             <a:extLst>
               <a:ext uri="{FF2B5EF4-FFF2-40B4-BE49-F238E27FC236}">
-                <a16:creationId xmlns:a16="http://schemas.microsoft.com/office/drawing/2014/main" xmlns="" id="{931CAE2B-3739-E749-AFC3-8FF0F5318057}"/>
+                <a16:creationId xmlns:a16="http://schemas.microsoft.com/office/drawing/2014/main" id="{931CAE2B-3739-E749-AFC3-8FF0F5318057}"/>
               </a:ext>
             </a:extLst>
           </p:cNvPr>
@@ -5743,7 +5747,7 @@
           <p:cNvPr id="33" name="Straight Connector 32">
             <a:extLst>
               <a:ext uri="{FF2B5EF4-FFF2-40B4-BE49-F238E27FC236}">
-                <a16:creationId xmlns:a16="http://schemas.microsoft.com/office/drawing/2014/main" xmlns="" id="{575FB9A1-2A60-0440-87E9-9EF358ED596C}"/>
+                <a16:creationId xmlns:a16="http://schemas.microsoft.com/office/drawing/2014/main" id="{575FB9A1-2A60-0440-87E9-9EF358ED596C}"/>
               </a:ext>
             </a:extLst>
           </p:cNvPr>
@@ -5782,7 +5786,7 @@
           <p:cNvPr id="35" name="Straight Connector 34">
             <a:extLst>
               <a:ext uri="{FF2B5EF4-FFF2-40B4-BE49-F238E27FC236}">
-                <a16:creationId xmlns:a16="http://schemas.microsoft.com/office/drawing/2014/main" xmlns="" id="{88A1850E-CD69-1649-A05E-8AFBAA505FD7}"/>
+                <a16:creationId xmlns:a16="http://schemas.microsoft.com/office/drawing/2014/main" id="{88A1850E-CD69-1649-A05E-8AFBAA505FD7}"/>
               </a:ext>
             </a:extLst>
           </p:cNvPr>
@@ -5821,7 +5825,7 @@
           <p:cNvPr id="40" name="Straight Connector 39">
             <a:extLst>
               <a:ext uri="{FF2B5EF4-FFF2-40B4-BE49-F238E27FC236}">
-                <a16:creationId xmlns:a16="http://schemas.microsoft.com/office/drawing/2014/main" xmlns="" id="{85936ABA-53DB-7541-A3A9-B326378109BB}"/>
+                <a16:creationId xmlns:a16="http://schemas.microsoft.com/office/drawing/2014/main" id="{85936ABA-53DB-7541-A3A9-B326378109BB}"/>
               </a:ext>
             </a:extLst>
           </p:cNvPr>
@@ -5860,7 +5864,7 @@
           <p:cNvPr id="42" name="直線矢印コネクタ 17">
             <a:extLst>
               <a:ext uri="{FF2B5EF4-FFF2-40B4-BE49-F238E27FC236}">
-                <a16:creationId xmlns:a16="http://schemas.microsoft.com/office/drawing/2014/main" xmlns="" id="{B5342E1A-177F-CD4A-95C3-440FC11D1ADA}"/>
+                <a16:creationId xmlns:a16="http://schemas.microsoft.com/office/drawing/2014/main" id="{B5342E1A-177F-CD4A-95C3-440FC11D1ADA}"/>
               </a:ext>
             </a:extLst>
           </p:cNvPr>
@@ -5901,7 +5905,7 @@
           <p:cNvPr id="56" name="Group 55">
             <a:extLst>
               <a:ext uri="{FF2B5EF4-FFF2-40B4-BE49-F238E27FC236}">
-                <a16:creationId xmlns:a16="http://schemas.microsoft.com/office/drawing/2014/main" xmlns="" id="{2D959D33-4592-6241-AF4E-D65E8625FEFB}"/>
+                <a16:creationId xmlns:a16="http://schemas.microsoft.com/office/drawing/2014/main" id="{2D959D33-4592-6241-AF4E-D65E8625FEFB}"/>
               </a:ext>
             </a:extLst>
           </p:cNvPr>
@@ -5921,7 +5925,7 @@
             <p:cNvPr id="45" name="Oval 44">
               <a:extLst>
                 <a:ext uri="{FF2B5EF4-FFF2-40B4-BE49-F238E27FC236}">
-                  <a16:creationId xmlns:a16="http://schemas.microsoft.com/office/drawing/2014/main" xmlns="" id="{935AC238-E6E2-2643-9B0F-E136836BE7D4}"/>
+                  <a16:creationId xmlns:a16="http://schemas.microsoft.com/office/drawing/2014/main" id="{935AC238-E6E2-2643-9B0F-E136836BE7D4}"/>
                 </a:ext>
               </a:extLst>
             </p:cNvPr>
@@ -5967,7 +5971,7 @@
             <p:cNvPr id="46" name="Oval 45">
               <a:extLst>
                 <a:ext uri="{FF2B5EF4-FFF2-40B4-BE49-F238E27FC236}">
-                  <a16:creationId xmlns:a16="http://schemas.microsoft.com/office/drawing/2014/main" xmlns="" id="{E422B34F-EF76-BD48-BD1A-5CC0D46B90F7}"/>
+                  <a16:creationId xmlns:a16="http://schemas.microsoft.com/office/drawing/2014/main" id="{E422B34F-EF76-BD48-BD1A-5CC0D46B90F7}"/>
                 </a:ext>
               </a:extLst>
             </p:cNvPr>
@@ -6013,7 +6017,7 @@
             <p:cNvPr id="47" name="Oval 46">
               <a:extLst>
                 <a:ext uri="{FF2B5EF4-FFF2-40B4-BE49-F238E27FC236}">
-                  <a16:creationId xmlns:a16="http://schemas.microsoft.com/office/drawing/2014/main" xmlns="" id="{8DDF368E-408E-114E-8B8B-24CF9BAD529C}"/>
+                  <a16:creationId xmlns:a16="http://schemas.microsoft.com/office/drawing/2014/main" id="{8DDF368E-408E-114E-8B8B-24CF9BAD529C}"/>
                 </a:ext>
               </a:extLst>
             </p:cNvPr>
@@ -6059,7 +6063,7 @@
             <p:cNvPr id="48" name="Oval 47">
               <a:extLst>
                 <a:ext uri="{FF2B5EF4-FFF2-40B4-BE49-F238E27FC236}">
-                  <a16:creationId xmlns:a16="http://schemas.microsoft.com/office/drawing/2014/main" xmlns="" id="{4BD5F66E-B454-3240-8BC2-45992CC7E4CD}"/>
+                  <a16:creationId xmlns:a16="http://schemas.microsoft.com/office/drawing/2014/main" id="{4BD5F66E-B454-3240-8BC2-45992CC7E4CD}"/>
                 </a:ext>
               </a:extLst>
             </p:cNvPr>
@@ -6105,7 +6109,7 @@
             <p:cNvPr id="49" name="Oval 48">
               <a:extLst>
                 <a:ext uri="{FF2B5EF4-FFF2-40B4-BE49-F238E27FC236}">
-                  <a16:creationId xmlns:a16="http://schemas.microsoft.com/office/drawing/2014/main" xmlns="" id="{894C2FD1-5E7E-7847-A94A-473DA7C8B636}"/>
+                  <a16:creationId xmlns:a16="http://schemas.microsoft.com/office/drawing/2014/main" id="{894C2FD1-5E7E-7847-A94A-473DA7C8B636}"/>
                 </a:ext>
               </a:extLst>
             </p:cNvPr>
@@ -6151,7 +6155,7 @@
             <p:cNvPr id="50" name="Straight Connector 49">
               <a:extLst>
                 <a:ext uri="{FF2B5EF4-FFF2-40B4-BE49-F238E27FC236}">
-                  <a16:creationId xmlns:a16="http://schemas.microsoft.com/office/drawing/2014/main" xmlns="" id="{664F36E1-C5F6-B746-B49A-884B06626ECE}"/>
+                  <a16:creationId xmlns:a16="http://schemas.microsoft.com/office/drawing/2014/main" id="{664F36E1-C5F6-B746-B49A-884B06626ECE}"/>
                 </a:ext>
               </a:extLst>
             </p:cNvPr>
@@ -6191,7 +6195,7 @@
             <p:cNvPr id="51" name="Straight Connector 50">
               <a:extLst>
                 <a:ext uri="{FF2B5EF4-FFF2-40B4-BE49-F238E27FC236}">
-                  <a16:creationId xmlns:a16="http://schemas.microsoft.com/office/drawing/2014/main" xmlns="" id="{62CCD05C-9AFC-9B41-A681-897093A7548D}"/>
+                  <a16:creationId xmlns:a16="http://schemas.microsoft.com/office/drawing/2014/main" id="{62CCD05C-9AFC-9B41-A681-897093A7548D}"/>
                 </a:ext>
               </a:extLst>
             </p:cNvPr>
@@ -6230,7 +6234,7 @@
             <p:cNvPr id="52" name="Straight Connector 51">
               <a:extLst>
                 <a:ext uri="{FF2B5EF4-FFF2-40B4-BE49-F238E27FC236}">
-                  <a16:creationId xmlns:a16="http://schemas.microsoft.com/office/drawing/2014/main" xmlns="" id="{975D1C85-0E92-6B4B-90A8-D9F713B3D17F}"/>
+                  <a16:creationId xmlns:a16="http://schemas.microsoft.com/office/drawing/2014/main" id="{975D1C85-0E92-6B4B-90A8-D9F713B3D17F}"/>
                 </a:ext>
               </a:extLst>
             </p:cNvPr>
@@ -6270,7 +6274,7 @@
             <p:cNvPr id="53" name="Straight Connector 52">
               <a:extLst>
                 <a:ext uri="{FF2B5EF4-FFF2-40B4-BE49-F238E27FC236}">
-                  <a16:creationId xmlns:a16="http://schemas.microsoft.com/office/drawing/2014/main" xmlns="" id="{65740447-AD2D-104C-AFE7-F429DAD14FB8}"/>
+                  <a16:creationId xmlns:a16="http://schemas.microsoft.com/office/drawing/2014/main" id="{65740447-AD2D-104C-AFE7-F429DAD14FB8}"/>
                 </a:ext>
               </a:extLst>
             </p:cNvPr>
@@ -6309,7 +6313,7 @@
             <p:cNvPr id="54" name="Straight Connector 53">
               <a:extLst>
                 <a:ext uri="{FF2B5EF4-FFF2-40B4-BE49-F238E27FC236}">
-                  <a16:creationId xmlns:a16="http://schemas.microsoft.com/office/drawing/2014/main" xmlns="" id="{CC599206-FC07-594F-8EE7-A6CA2B45F234}"/>
+                  <a16:creationId xmlns:a16="http://schemas.microsoft.com/office/drawing/2014/main" id="{CC599206-FC07-594F-8EE7-A6CA2B45F234}"/>
                 </a:ext>
               </a:extLst>
             </p:cNvPr>
@@ -6348,7 +6352,7 @@
             <p:cNvPr id="55" name="Straight Connector 54">
               <a:extLst>
                 <a:ext uri="{FF2B5EF4-FFF2-40B4-BE49-F238E27FC236}">
-                  <a16:creationId xmlns:a16="http://schemas.microsoft.com/office/drawing/2014/main" xmlns="" id="{F76E8DF1-3DC4-5640-A9C5-5C3D12B750E0}"/>
+                  <a16:creationId xmlns:a16="http://schemas.microsoft.com/office/drawing/2014/main" id="{F76E8DF1-3DC4-5640-A9C5-5C3D12B750E0}"/>
                 </a:ext>
               </a:extLst>
             </p:cNvPr>
@@ -6471,7 +6475,8 @@
             <a:avLst/>
           </a:prstGeom>
           <a:ln>
-            <a:tailEnd type="arrow"/>
+            <a:headEnd type="arrow" w="med" len="med"/>
+            <a:tailEnd type="arrow" w="med" len="med"/>
           </a:ln>
         </p:spPr>
         <p:style>
@@ -6592,7 +6597,7 @@
           <p:cNvPr id="2" name="Group 1">
             <a:extLst>
               <a:ext uri="{FF2B5EF4-FFF2-40B4-BE49-F238E27FC236}">
-                <a16:creationId xmlns:a16="http://schemas.microsoft.com/office/drawing/2014/main" xmlns="" id="{A724D2BE-BF5E-D94F-8450-1751B4AE53D7}"/>
+                <a16:creationId xmlns:a16="http://schemas.microsoft.com/office/drawing/2014/main" id="{A724D2BE-BF5E-D94F-8450-1751B4AE53D7}"/>
               </a:ext>
             </a:extLst>
           </p:cNvPr>
@@ -6643,7 +6648,7 @@
             <p:cNvPr id="29" name="Oval 28">
               <a:extLst>
                 <a:ext uri="{FF2B5EF4-FFF2-40B4-BE49-F238E27FC236}">
-                  <a16:creationId xmlns:a16="http://schemas.microsoft.com/office/drawing/2014/main" xmlns="" id="{FAAC52EC-CA61-844C-BFEC-FD01C27DCB59}"/>
+                  <a16:creationId xmlns:a16="http://schemas.microsoft.com/office/drawing/2014/main" id="{FAAC52EC-CA61-844C-BFEC-FD01C27DCB59}"/>
                 </a:ext>
               </a:extLst>
             </p:cNvPr>
@@ -6738,7 +6743,7 @@
           <p:cNvPr id="57" name="正方形/長方形 17">
             <a:extLst>
               <a:ext uri="{FF2B5EF4-FFF2-40B4-BE49-F238E27FC236}">
-                <a16:creationId xmlns:a16="http://schemas.microsoft.com/office/drawing/2014/main" xmlns="" id="{130B3935-1247-3348-8096-94B45ADA2C4F}"/>
+                <a16:creationId xmlns:a16="http://schemas.microsoft.com/office/drawing/2014/main" id="{130B3935-1247-3348-8096-94B45ADA2C4F}"/>
               </a:ext>
             </a:extLst>
           </p:cNvPr>
@@ -6846,7 +6851,7 @@
           <p:cNvPr id="58" name="Group 57">
             <a:extLst>
               <a:ext uri="{FF2B5EF4-FFF2-40B4-BE49-F238E27FC236}">
-                <a16:creationId xmlns:a16="http://schemas.microsoft.com/office/drawing/2014/main" xmlns="" id="{1122A44C-DC11-CA43-AAB9-934279EF613C}"/>
+                <a16:creationId xmlns:a16="http://schemas.microsoft.com/office/drawing/2014/main" id="{1122A44C-DC11-CA43-AAB9-934279EF613C}"/>
               </a:ext>
             </a:extLst>
           </p:cNvPr>
@@ -6866,7 +6871,7 @@
             <p:cNvPr id="59" name="Oval 58">
               <a:extLst>
                 <a:ext uri="{FF2B5EF4-FFF2-40B4-BE49-F238E27FC236}">
-                  <a16:creationId xmlns:a16="http://schemas.microsoft.com/office/drawing/2014/main" xmlns="" id="{1AC815EF-350D-6F45-BCCD-E2241D4A81AE}"/>
+                  <a16:creationId xmlns:a16="http://schemas.microsoft.com/office/drawing/2014/main" id="{1AC815EF-350D-6F45-BCCD-E2241D4A81AE}"/>
                 </a:ext>
               </a:extLst>
             </p:cNvPr>
@@ -6912,7 +6917,7 @@
             <p:cNvPr id="60" name="Oval 59">
               <a:extLst>
                 <a:ext uri="{FF2B5EF4-FFF2-40B4-BE49-F238E27FC236}">
-                  <a16:creationId xmlns:a16="http://schemas.microsoft.com/office/drawing/2014/main" xmlns="" id="{688CB2FF-E17D-6B45-A615-DD1CE4CF8524}"/>
+                  <a16:creationId xmlns:a16="http://schemas.microsoft.com/office/drawing/2014/main" id="{688CB2FF-E17D-6B45-A615-DD1CE4CF8524}"/>
                 </a:ext>
               </a:extLst>
             </p:cNvPr>
@@ -6958,7 +6963,7 @@
             <p:cNvPr id="61" name="Oval 60">
               <a:extLst>
                 <a:ext uri="{FF2B5EF4-FFF2-40B4-BE49-F238E27FC236}">
-                  <a16:creationId xmlns:a16="http://schemas.microsoft.com/office/drawing/2014/main" xmlns="" id="{26E520C9-124A-AB42-AC17-4C557C0B1892}"/>
+                  <a16:creationId xmlns:a16="http://schemas.microsoft.com/office/drawing/2014/main" id="{26E520C9-124A-AB42-AC17-4C557C0B1892}"/>
                 </a:ext>
               </a:extLst>
             </p:cNvPr>
@@ -7004,7 +7009,7 @@
             <p:cNvPr id="62" name="Oval 61">
               <a:extLst>
                 <a:ext uri="{FF2B5EF4-FFF2-40B4-BE49-F238E27FC236}">
-                  <a16:creationId xmlns:a16="http://schemas.microsoft.com/office/drawing/2014/main" xmlns="" id="{D5129498-28A3-D649-B52F-8D571E7DC550}"/>
+                  <a16:creationId xmlns:a16="http://schemas.microsoft.com/office/drawing/2014/main" id="{D5129498-28A3-D649-B52F-8D571E7DC550}"/>
                 </a:ext>
               </a:extLst>
             </p:cNvPr>
@@ -7050,7 +7055,7 @@
             <p:cNvPr id="63" name="Oval 62">
               <a:extLst>
                 <a:ext uri="{FF2B5EF4-FFF2-40B4-BE49-F238E27FC236}">
-                  <a16:creationId xmlns:a16="http://schemas.microsoft.com/office/drawing/2014/main" xmlns="" id="{70A70BE7-7284-2142-B14C-E538299F3475}"/>
+                  <a16:creationId xmlns:a16="http://schemas.microsoft.com/office/drawing/2014/main" id="{70A70BE7-7284-2142-B14C-E538299F3475}"/>
                 </a:ext>
               </a:extLst>
             </p:cNvPr>
@@ -7096,7 +7101,7 @@
             <p:cNvPr id="64" name="Straight Connector 63">
               <a:extLst>
                 <a:ext uri="{FF2B5EF4-FFF2-40B4-BE49-F238E27FC236}">
-                  <a16:creationId xmlns:a16="http://schemas.microsoft.com/office/drawing/2014/main" xmlns="" id="{A6AC5435-4154-9247-86BE-33A7078000C7}"/>
+                  <a16:creationId xmlns:a16="http://schemas.microsoft.com/office/drawing/2014/main" id="{A6AC5435-4154-9247-86BE-33A7078000C7}"/>
                 </a:ext>
               </a:extLst>
             </p:cNvPr>
@@ -7136,7 +7141,7 @@
             <p:cNvPr id="65" name="Straight Connector 64">
               <a:extLst>
                 <a:ext uri="{FF2B5EF4-FFF2-40B4-BE49-F238E27FC236}">
-                  <a16:creationId xmlns:a16="http://schemas.microsoft.com/office/drawing/2014/main" xmlns="" id="{231C7164-9912-9E4F-A64F-01D94572A9EF}"/>
+                  <a16:creationId xmlns:a16="http://schemas.microsoft.com/office/drawing/2014/main" id="{231C7164-9912-9E4F-A64F-01D94572A9EF}"/>
                 </a:ext>
               </a:extLst>
             </p:cNvPr>
@@ -7175,7 +7180,7 @@
             <p:cNvPr id="66" name="Straight Connector 65">
               <a:extLst>
                 <a:ext uri="{FF2B5EF4-FFF2-40B4-BE49-F238E27FC236}">
-                  <a16:creationId xmlns:a16="http://schemas.microsoft.com/office/drawing/2014/main" xmlns="" id="{1A6B4F5F-7A36-8143-9249-47E02A5B4934}"/>
+                  <a16:creationId xmlns:a16="http://schemas.microsoft.com/office/drawing/2014/main" id="{1A6B4F5F-7A36-8143-9249-47E02A5B4934}"/>
                 </a:ext>
               </a:extLst>
             </p:cNvPr>
@@ -7215,7 +7220,7 @@
             <p:cNvPr id="67" name="Straight Connector 66">
               <a:extLst>
                 <a:ext uri="{FF2B5EF4-FFF2-40B4-BE49-F238E27FC236}">
-                  <a16:creationId xmlns:a16="http://schemas.microsoft.com/office/drawing/2014/main" xmlns="" id="{16051331-1194-A043-83BE-29C603BF44F4}"/>
+                  <a16:creationId xmlns:a16="http://schemas.microsoft.com/office/drawing/2014/main" id="{16051331-1194-A043-83BE-29C603BF44F4}"/>
                 </a:ext>
               </a:extLst>
             </p:cNvPr>
@@ -7254,7 +7259,7 @@
             <p:cNvPr id="68" name="Straight Connector 67">
               <a:extLst>
                 <a:ext uri="{FF2B5EF4-FFF2-40B4-BE49-F238E27FC236}">
-                  <a16:creationId xmlns:a16="http://schemas.microsoft.com/office/drawing/2014/main" xmlns="" id="{772F3E67-FAA9-A54E-8084-35529CE58F05}"/>
+                  <a16:creationId xmlns:a16="http://schemas.microsoft.com/office/drawing/2014/main" id="{772F3E67-FAA9-A54E-8084-35529CE58F05}"/>
                 </a:ext>
               </a:extLst>
             </p:cNvPr>
@@ -7293,7 +7298,7 @@
             <p:cNvPr id="69" name="Straight Connector 68">
               <a:extLst>
                 <a:ext uri="{FF2B5EF4-FFF2-40B4-BE49-F238E27FC236}">
-                  <a16:creationId xmlns:a16="http://schemas.microsoft.com/office/drawing/2014/main" xmlns="" id="{39E82FE7-2144-914E-B2ED-620F8FB1ECCC}"/>
+                  <a16:creationId xmlns:a16="http://schemas.microsoft.com/office/drawing/2014/main" id="{39E82FE7-2144-914E-B2ED-620F8FB1ECCC}"/>
                 </a:ext>
               </a:extLst>
             </p:cNvPr>
@@ -7333,7 +7338,7 @@
           <p:cNvPr id="39" name="Group 38">
             <a:extLst>
               <a:ext uri="{FF2B5EF4-FFF2-40B4-BE49-F238E27FC236}">
-                <a16:creationId xmlns:a16="http://schemas.microsoft.com/office/drawing/2014/main" xmlns="" id="{DE0D024D-E610-9C44-B9AB-6B32B11980F5}"/>
+                <a16:creationId xmlns:a16="http://schemas.microsoft.com/office/drawing/2014/main" id="{DE0D024D-E610-9C44-B9AB-6B32B11980F5}"/>
               </a:ext>
             </a:extLst>
           </p:cNvPr>
@@ -7353,7 +7358,7 @@
             <p:cNvPr id="41" name="テキスト ボックス 18">
               <a:extLst>
                 <a:ext uri="{FF2B5EF4-FFF2-40B4-BE49-F238E27FC236}">
-                  <a16:creationId xmlns:a16="http://schemas.microsoft.com/office/drawing/2014/main" xmlns="" id="{1DF7A3EA-0B7B-E047-ADF2-03E2F0237530}"/>
+                  <a16:creationId xmlns:a16="http://schemas.microsoft.com/office/drawing/2014/main" id="{1DF7A3EA-0B7B-E047-ADF2-03E2F0237530}"/>
                 </a:ext>
               </a:extLst>
             </p:cNvPr>
@@ -7390,7 +7395,7 @@
             <p:cNvPr id="47" name="Oval 46">
               <a:extLst>
                 <a:ext uri="{FF2B5EF4-FFF2-40B4-BE49-F238E27FC236}">
-                  <a16:creationId xmlns:a16="http://schemas.microsoft.com/office/drawing/2014/main" xmlns="" id="{C51DCDB6-BC26-AF45-A54A-78FAAED27892}"/>
+                  <a16:creationId xmlns:a16="http://schemas.microsoft.com/office/drawing/2014/main" id="{C51DCDB6-BC26-AF45-A54A-78FAAED27892}"/>
                 </a:ext>
               </a:extLst>
             </p:cNvPr>
@@ -7436,7 +7441,7 @@
             <p:cNvPr id="49" name="Oval 48">
               <a:extLst>
                 <a:ext uri="{FF2B5EF4-FFF2-40B4-BE49-F238E27FC236}">
-                  <a16:creationId xmlns:a16="http://schemas.microsoft.com/office/drawing/2014/main" xmlns="" id="{6D9C70A9-A9AB-514E-8AFF-292DA1D65D75}"/>
+                  <a16:creationId xmlns:a16="http://schemas.microsoft.com/office/drawing/2014/main" id="{6D9C70A9-A9AB-514E-8AFF-292DA1D65D75}"/>
                 </a:ext>
               </a:extLst>
             </p:cNvPr>
@@ -7482,7 +7487,7 @@
             <p:cNvPr id="50" name="Straight Connector 49">
               <a:extLst>
                 <a:ext uri="{FF2B5EF4-FFF2-40B4-BE49-F238E27FC236}">
-                  <a16:creationId xmlns:a16="http://schemas.microsoft.com/office/drawing/2014/main" xmlns="" id="{2B9A51C9-0C81-424D-BC99-0DAC0CD96346}"/>
+                  <a16:creationId xmlns:a16="http://schemas.microsoft.com/office/drawing/2014/main" id="{2B9A51C9-0C81-424D-BC99-0DAC0CD96346}"/>
                 </a:ext>
               </a:extLst>
             </p:cNvPr>
@@ -7522,7 +7527,7 @@
             <p:cNvPr id="70" name="角丸四角形 13">
               <a:extLst>
                 <a:ext uri="{FF2B5EF4-FFF2-40B4-BE49-F238E27FC236}">
-                  <a16:creationId xmlns:a16="http://schemas.microsoft.com/office/drawing/2014/main" xmlns="" id="{565B3D43-791E-B74E-95D6-7806FF813553}"/>
+                  <a16:creationId xmlns:a16="http://schemas.microsoft.com/office/drawing/2014/main" id="{565B3D43-791E-B74E-95D6-7806FF813553}"/>
                 </a:ext>
               </a:extLst>
             </p:cNvPr>
@@ -7577,7 +7582,7 @@
           <p:cNvPr id="71" name="Group 70">
             <a:extLst>
               <a:ext uri="{FF2B5EF4-FFF2-40B4-BE49-F238E27FC236}">
-                <a16:creationId xmlns:a16="http://schemas.microsoft.com/office/drawing/2014/main" xmlns="" id="{EC02AD1C-ED5E-544B-9F26-9A12E126773C}"/>
+                <a16:creationId xmlns:a16="http://schemas.microsoft.com/office/drawing/2014/main" id="{EC02AD1C-ED5E-544B-9F26-9A12E126773C}"/>
               </a:ext>
             </a:extLst>
           </p:cNvPr>
@@ -7597,7 +7602,7 @@
             <p:cNvPr id="72" name="テキスト ボックス 18">
               <a:extLst>
                 <a:ext uri="{FF2B5EF4-FFF2-40B4-BE49-F238E27FC236}">
-                  <a16:creationId xmlns:a16="http://schemas.microsoft.com/office/drawing/2014/main" xmlns="" id="{9B4403F3-B466-C541-8B4E-0CB5B846E735}"/>
+                  <a16:creationId xmlns:a16="http://schemas.microsoft.com/office/drawing/2014/main" id="{9B4403F3-B466-C541-8B4E-0CB5B846E735}"/>
                 </a:ext>
               </a:extLst>
             </p:cNvPr>
@@ -7634,7 +7639,7 @@
             <p:cNvPr id="75" name="Oval 74">
               <a:extLst>
                 <a:ext uri="{FF2B5EF4-FFF2-40B4-BE49-F238E27FC236}">
-                  <a16:creationId xmlns:a16="http://schemas.microsoft.com/office/drawing/2014/main" xmlns="" id="{3F89615E-4D26-E445-AC9F-AD2A1B7118E3}"/>
+                  <a16:creationId xmlns:a16="http://schemas.microsoft.com/office/drawing/2014/main" id="{3F89615E-4D26-E445-AC9F-AD2A1B7118E3}"/>
                 </a:ext>
               </a:extLst>
             </p:cNvPr>
@@ -7680,7 +7685,7 @@
             <p:cNvPr id="76" name="Oval 75">
               <a:extLst>
                 <a:ext uri="{FF2B5EF4-FFF2-40B4-BE49-F238E27FC236}">
-                  <a16:creationId xmlns:a16="http://schemas.microsoft.com/office/drawing/2014/main" xmlns="" id="{153D8E13-80FF-5640-82D3-7E672FDC25F8}"/>
+                  <a16:creationId xmlns:a16="http://schemas.microsoft.com/office/drawing/2014/main" id="{153D8E13-80FF-5640-82D3-7E672FDC25F8}"/>
                 </a:ext>
               </a:extLst>
             </p:cNvPr>
@@ -7726,7 +7731,7 @@
             <p:cNvPr id="82" name="Straight Connector 81">
               <a:extLst>
                 <a:ext uri="{FF2B5EF4-FFF2-40B4-BE49-F238E27FC236}">
-                  <a16:creationId xmlns:a16="http://schemas.microsoft.com/office/drawing/2014/main" xmlns="" id="{4196479E-E391-1B4F-B99B-2EB7D771CDA3}"/>
+                  <a16:creationId xmlns:a16="http://schemas.microsoft.com/office/drawing/2014/main" id="{4196479E-E391-1B4F-B99B-2EB7D771CDA3}"/>
                 </a:ext>
               </a:extLst>
             </p:cNvPr>
@@ -7766,7 +7771,7 @@
             <p:cNvPr id="87" name="角丸四角形 13">
               <a:extLst>
                 <a:ext uri="{FF2B5EF4-FFF2-40B4-BE49-F238E27FC236}">
-                  <a16:creationId xmlns:a16="http://schemas.microsoft.com/office/drawing/2014/main" xmlns="" id="{84C6FA27-51E2-0E4F-A3F8-517FE61B0D3E}"/>
+                  <a16:creationId xmlns:a16="http://schemas.microsoft.com/office/drawing/2014/main" id="{84C6FA27-51E2-0E4F-A3F8-517FE61B0D3E}"/>
                 </a:ext>
               </a:extLst>
             </p:cNvPr>
@@ -7821,7 +7826,7 @@
           <p:cNvPr id="88" name="正方形/長方形 17">
             <a:extLst>
               <a:ext uri="{FF2B5EF4-FFF2-40B4-BE49-F238E27FC236}">
-                <a16:creationId xmlns:a16="http://schemas.microsoft.com/office/drawing/2014/main" xmlns="" id="{D2EE812D-FAAE-9443-A3A9-48A1D99DE467}"/>
+                <a16:creationId xmlns:a16="http://schemas.microsoft.com/office/drawing/2014/main" id="{D2EE812D-FAAE-9443-A3A9-48A1D99DE467}"/>
               </a:ext>
             </a:extLst>
           </p:cNvPr>
@@ -7879,7 +7884,7 @@
           <p:cNvPr id="89" name="正方形/長方形 17">
             <a:extLst>
               <a:ext uri="{FF2B5EF4-FFF2-40B4-BE49-F238E27FC236}">
-                <a16:creationId xmlns:a16="http://schemas.microsoft.com/office/drawing/2014/main" xmlns="" id="{9E9C6593-469B-934D-9C79-2016283FEC15}"/>
+                <a16:creationId xmlns:a16="http://schemas.microsoft.com/office/drawing/2014/main" id="{9E9C6593-469B-934D-9C79-2016283FEC15}"/>
               </a:ext>
             </a:extLst>
           </p:cNvPr>
@@ -8178,7 +8183,7 @@
           <a:noFill/>
           <a:extLst>
             <a:ext uri="{909E8E84-426E-40dd-AFC4-6F175D3DCCD1}">
-              <a14:hiddenFill xmlns:a14="http://schemas.microsoft.com/office/drawing/2010/main">
+              <a14:hiddenFill xmlns:a14="http://schemas.microsoft.com/office/drawing/2010/main" xmlns="">
                 <a:solidFill>
                   <a:srgbClr val="FFFFFF"/>
                 </a:solidFill>
@@ -8219,7 +8224,7 @@
           <a:noFill/>
           <a:extLst>
             <a:ext uri="{909E8E84-426E-40dd-AFC4-6F175D3DCCD1}">
-              <a14:hiddenFill xmlns:a14="http://schemas.microsoft.com/office/drawing/2010/main">
+              <a14:hiddenFill xmlns:a14="http://schemas.microsoft.com/office/drawing/2010/main" xmlns="">
                 <a:solidFill>
                   <a:srgbClr val="FFFFFF"/>
                 </a:solidFill>
@@ -8364,7 +8369,7 @@
           <a:noFill/>
           <a:extLst>
             <a:ext uri="{909E8E84-426E-40dd-AFC4-6F175D3DCCD1}">
-              <a14:hiddenFill xmlns:a14="http://schemas.microsoft.com/office/drawing/2010/main">
+              <a14:hiddenFill xmlns:a14="http://schemas.microsoft.com/office/drawing/2010/main" xmlns="">
                 <a:solidFill>
                   <a:srgbClr val="FFFFFF"/>
                 </a:solidFill>
@@ -8405,7 +8410,7 @@
           <a:noFill/>
           <a:extLst>
             <a:ext uri="{909E8E84-426E-40dd-AFC4-6F175D3DCCD1}">
-              <a14:hiddenFill xmlns:a14="http://schemas.microsoft.com/office/drawing/2010/main">
+              <a14:hiddenFill xmlns:a14="http://schemas.microsoft.com/office/drawing/2010/main" xmlns="">
                 <a:solidFill>
                   <a:srgbClr val="FFFFFF"/>
                 </a:solidFill>
@@ -8613,7 +8618,7 @@
           <a:noFill/>
           <a:extLst>
             <a:ext uri="{909E8E84-426E-40dd-AFC4-6F175D3DCCD1}">
-              <a14:hiddenFill xmlns:a14="http://schemas.microsoft.com/office/drawing/2010/main">
+              <a14:hiddenFill xmlns:a14="http://schemas.microsoft.com/office/drawing/2010/main" xmlns="">
                 <a:solidFill>
                   <a:srgbClr val="FFFFFF"/>
                 </a:solidFill>
@@ -8840,7 +8845,7 @@
           <a:noFill/>
           <a:extLst>
             <a:ext uri="{909E8E84-426E-40dd-AFC4-6F175D3DCCD1}">
-              <a14:hiddenFill xmlns:a14="http://schemas.microsoft.com/office/drawing/2010/main">
+              <a14:hiddenFill xmlns:a14="http://schemas.microsoft.com/office/drawing/2010/main" xmlns="">
                 <a:solidFill>
                   <a:srgbClr val="FFFFFF"/>
                 </a:solidFill>
@@ -8881,7 +8886,7 @@
           <a:noFill/>
           <a:extLst>
             <a:ext uri="{909E8E84-426E-40dd-AFC4-6F175D3DCCD1}">
-              <a14:hiddenFill xmlns:a14="http://schemas.microsoft.com/office/drawing/2010/main">
+              <a14:hiddenFill xmlns:a14="http://schemas.microsoft.com/office/drawing/2010/main" xmlns="">
                 <a:solidFill>
                   <a:srgbClr val="FFFFFF"/>
                 </a:solidFill>
@@ -9160,7 +9165,7 @@
           <a:noFill/>
           <a:extLst>
             <a:ext uri="{909E8E84-426E-40dd-AFC4-6F175D3DCCD1}">
-              <a14:hiddenFill xmlns:a14="http://schemas.microsoft.com/office/drawing/2010/main">
+              <a14:hiddenFill xmlns:a14="http://schemas.microsoft.com/office/drawing/2010/main" xmlns="">
                 <a:solidFill>
                   <a:srgbClr val="FFFFFF"/>
                 </a:solidFill>
@@ -9201,7 +9206,7 @@
           <a:noFill/>
           <a:extLst>
             <a:ext uri="{909E8E84-426E-40dd-AFC4-6F175D3DCCD1}">
-              <a14:hiddenFill xmlns:a14="http://schemas.microsoft.com/office/drawing/2010/main">
+              <a14:hiddenFill xmlns:a14="http://schemas.microsoft.com/office/drawing/2010/main" xmlns="">
                 <a:solidFill>
                   <a:srgbClr val="FFFFFF"/>
                 </a:solidFill>
@@ -9242,7 +9247,7 @@
           <a:noFill/>
           <a:extLst>
             <a:ext uri="{909E8E84-426E-40dd-AFC4-6F175D3DCCD1}">
-              <a14:hiddenFill xmlns:a14="http://schemas.microsoft.com/office/drawing/2010/main">
+              <a14:hiddenFill xmlns:a14="http://schemas.microsoft.com/office/drawing/2010/main" xmlns="">
                 <a:solidFill>
                   <a:srgbClr val="FFFFFF"/>
                 </a:solidFill>
@@ -9283,7 +9288,7 @@
           <a:noFill/>
           <a:extLst>
             <a:ext uri="{909E8E84-426E-40dd-AFC4-6F175D3DCCD1}">
-              <a14:hiddenFill xmlns:a14="http://schemas.microsoft.com/office/drawing/2010/main">
+              <a14:hiddenFill xmlns:a14="http://schemas.microsoft.com/office/drawing/2010/main" xmlns="">
                 <a:solidFill>
                   <a:srgbClr val="FFFFFF"/>
                 </a:solidFill>
@@ -9469,7 +9474,7 @@
           <a:noFill/>
           <a:extLst>
             <a:ext uri="{909E8E84-426E-40dd-AFC4-6F175D3DCCD1}">
-              <a14:hiddenFill xmlns:a14="http://schemas.microsoft.com/office/drawing/2010/main">
+              <a14:hiddenFill xmlns:a14="http://schemas.microsoft.com/office/drawing/2010/main" xmlns="">
                 <a:solidFill>
                   <a:srgbClr val="FFFFFF"/>
                 </a:solidFill>
@@ -9510,7 +9515,7 @@
           <a:noFill/>
           <a:extLst>
             <a:ext uri="{909E8E84-426E-40dd-AFC4-6F175D3DCCD1}">
-              <a14:hiddenFill xmlns:a14="http://schemas.microsoft.com/office/drawing/2010/main">
+              <a14:hiddenFill xmlns:a14="http://schemas.microsoft.com/office/drawing/2010/main" xmlns="">
                 <a:solidFill>
                   <a:srgbClr val="FFFFFF"/>
                 </a:solidFill>
@@ -9551,7 +9556,7 @@
           <a:noFill/>
           <a:extLst>
             <a:ext uri="{909E8E84-426E-40dd-AFC4-6F175D3DCCD1}">
-              <a14:hiddenFill xmlns:a14="http://schemas.microsoft.com/office/drawing/2010/main">
+              <a14:hiddenFill xmlns:a14="http://schemas.microsoft.com/office/drawing/2010/main" xmlns="">
                 <a:solidFill>
                   <a:srgbClr val="FFFFFF"/>
                 </a:solidFill>
@@ -9694,7 +9699,7 @@
           <a:noFill/>
           <a:extLst>
             <a:ext uri="{909E8E84-426E-40dd-AFC4-6F175D3DCCD1}">
-              <a14:hiddenFill xmlns:a14="http://schemas.microsoft.com/office/drawing/2010/main">
+              <a14:hiddenFill xmlns:a14="http://schemas.microsoft.com/office/drawing/2010/main" xmlns="">
                 <a:solidFill>
                   <a:srgbClr val="FFFFFF"/>
                 </a:solidFill>
@@ -9837,7 +9842,7 @@
           <a:noFill/>
           <a:extLst>
             <a:ext uri="{909E8E84-426E-40dd-AFC4-6F175D3DCCD1}">
-              <a14:hiddenFill xmlns:a14="http://schemas.microsoft.com/office/drawing/2010/main">
+              <a14:hiddenFill xmlns:a14="http://schemas.microsoft.com/office/drawing/2010/main" xmlns="">
                 <a:solidFill>
                   <a:srgbClr val="FFFFFF"/>
                 </a:solidFill>
@@ -9878,7 +9883,7 @@
           <a:noFill/>
           <a:extLst>
             <a:ext uri="{909E8E84-426E-40dd-AFC4-6F175D3DCCD1}">
-              <a14:hiddenFill xmlns:a14="http://schemas.microsoft.com/office/drawing/2010/main">
+              <a14:hiddenFill xmlns:a14="http://schemas.microsoft.com/office/drawing/2010/main" xmlns="">
                 <a:solidFill>
                   <a:srgbClr val="FFFFFF"/>
                 </a:solidFill>
@@ -9968,7 +9973,7 @@
           <a:noFill/>
           <a:extLst>
             <a:ext uri="{909E8E84-426E-40dd-AFC4-6F175D3DCCD1}">
-              <a14:hiddenFill xmlns:a14="http://schemas.microsoft.com/office/drawing/2010/main">
+              <a14:hiddenFill xmlns:a14="http://schemas.microsoft.com/office/drawing/2010/main" xmlns="">
                 <a:solidFill>
                   <a:srgbClr val="FFFFFF"/>
                 </a:solidFill>
@@ -10061,7 +10066,7 @@
           <a:noFill/>
           <a:extLst>
             <a:ext uri="{909E8E84-426E-40dd-AFC4-6F175D3DCCD1}">
-              <a14:hiddenFill xmlns:a14="http://schemas.microsoft.com/office/drawing/2010/main">
+              <a14:hiddenFill xmlns:a14="http://schemas.microsoft.com/office/drawing/2010/main" xmlns="">
                 <a:solidFill>
                   <a:srgbClr val="FFFFFF"/>
                 </a:solidFill>
@@ -10288,7 +10293,7 @@
           <a:noFill/>
           <a:extLst>
             <a:ext uri="{909E8E84-426E-40dd-AFC4-6F175D3DCCD1}">
-              <a14:hiddenFill xmlns:a14="http://schemas.microsoft.com/office/drawing/2010/main">
+              <a14:hiddenFill xmlns:a14="http://schemas.microsoft.com/office/drawing/2010/main" xmlns="">
                 <a:solidFill>
                   <a:srgbClr val="FFFFFF"/>
                 </a:solidFill>
@@ -10379,7 +10384,7 @@
           <a:noFill/>
           <a:extLst>
             <a:ext uri="{909E8E84-426E-40dd-AFC4-6F175D3DCCD1}">
-              <a14:hiddenFill xmlns:a14="http://schemas.microsoft.com/office/drawing/2010/main">
+              <a14:hiddenFill xmlns:a14="http://schemas.microsoft.com/office/drawing/2010/main" xmlns="">
                 <a:solidFill>
                   <a:srgbClr val="FFFFFF"/>
                 </a:solidFill>
@@ -11040,14 +11045,14 @@
           </a:ln>
           <a:extLst>
             <a:ext uri="{909E8E84-426E-40dd-AFC4-6F175D3DCCD1}">
-              <a14:hiddenFill xmlns:a14="http://schemas.microsoft.com/office/drawing/2010/main">
+              <a14:hiddenFill xmlns:a14="http://schemas.microsoft.com/office/drawing/2010/main" xmlns="">
                 <a:solidFill>
                   <a:schemeClr val="accent1"/>
                 </a:solidFill>
               </a14:hiddenFill>
             </a:ext>
             <a:ext uri="{91240B29-F687-4f45-9708-019B960494DF}">
-              <a14:hiddenLine xmlns:a14="http://schemas.microsoft.com/office/drawing/2010/main" w="9525">
+              <a14:hiddenLine xmlns:a14="http://schemas.microsoft.com/office/drawing/2010/main" xmlns="" w="9525">
                 <a:solidFill>
                   <a:schemeClr val="tx1"/>
                 </a:solidFill>
@@ -11091,7 +11096,7 @@
           <a:noFill/>
           <a:extLst>
             <a:ext uri="{909E8E84-426E-40dd-AFC4-6F175D3DCCD1}">
-              <a14:hiddenFill xmlns:a14="http://schemas.microsoft.com/office/drawing/2010/main">
+              <a14:hiddenFill xmlns:a14="http://schemas.microsoft.com/office/drawing/2010/main" xmlns="">
                 <a:solidFill>
                   <a:srgbClr val="FFFFFF"/>
                 </a:solidFill>
@@ -11105,7 +11110,7 @@
           <p:cNvPr id="15" name="テキスト ボックス 18">
             <a:extLst>
               <a:ext uri="{FF2B5EF4-FFF2-40B4-BE49-F238E27FC236}">
-                <a16:creationId xmlns:a16="http://schemas.microsoft.com/office/drawing/2014/main" xmlns="" id="{BE9A932B-47DB-4B4F-90A6-3F236BA6C6D0}"/>
+                <a16:creationId xmlns:a16="http://schemas.microsoft.com/office/drawing/2014/main" id="{BE9A932B-47DB-4B4F-90A6-3F236BA6C6D0}"/>
               </a:ext>
             </a:extLst>
           </p:cNvPr>
@@ -11498,7 +11503,7 @@
           <p:cNvPr id="15" name="テキスト ボックス 18">
             <a:extLst>
               <a:ext uri="{FF2B5EF4-FFF2-40B4-BE49-F238E27FC236}">
-                <a16:creationId xmlns:a16="http://schemas.microsoft.com/office/drawing/2014/main" xmlns="" id="{5B9D17E8-173F-4B4C-963C-C646B80CF2E7}"/>
+                <a16:creationId xmlns:a16="http://schemas.microsoft.com/office/drawing/2014/main" id="{5B9D17E8-173F-4B4C-963C-C646B80CF2E7}"/>
               </a:ext>
             </a:extLst>
           </p:cNvPr>
@@ -11691,7 +11696,8 @@
             <a:avLst/>
           </a:prstGeom>
           <a:ln>
-            <a:tailEnd type="arrow"/>
+            <a:headEnd type="arrow" w="med" len="med"/>
+            <a:tailEnd type="arrow" w="med" len="med"/>
           </a:ln>
         </p:spPr>
         <p:style>
@@ -11856,7 +11862,8 @@
             <a:avLst/>
           </a:prstGeom>
           <a:ln>
-            <a:tailEnd type="arrow"/>
+            <a:headEnd type="arrow" w="med" len="med"/>
+            <a:tailEnd type="arrow" w="med" len="med"/>
           </a:ln>
         </p:spPr>
         <p:style>
@@ -11879,7 +11886,7 @@
           <p:cNvPr id="12" name="テキスト ボックス 18">
             <a:extLst>
               <a:ext uri="{FF2B5EF4-FFF2-40B4-BE49-F238E27FC236}">
-                <a16:creationId xmlns:a16="http://schemas.microsoft.com/office/drawing/2014/main" xmlns="" id="{A8D79E22-D110-A944-A474-A42156233C3E}"/>
+                <a16:creationId xmlns:a16="http://schemas.microsoft.com/office/drawing/2014/main" id="{A8D79E22-D110-A944-A474-A42156233C3E}"/>
               </a:ext>
             </a:extLst>
           </p:cNvPr>
@@ -12050,7 +12057,7 @@
           <a:p>
             <a:pPr algn="ctr"/>
             <a:r>
-              <a:rPr kumimoji="1" lang="en-US" altLang="ja-JP" dirty="0" smtClean="0"/>
+              <a:rPr kumimoji="1" lang="en-US" altLang="ja-JP" dirty="0"/>
               <a:t>Appliances</a:t>
             </a:r>
             <a:endParaRPr kumimoji="1" lang="ja-JP" altLang="en-US" dirty="0"/>
@@ -12072,7 +12079,11 @@
             <a:avLst/>
           </a:prstGeom>
           <a:ln>
-            <a:tailEnd type="arrow"/>
+            <a:solidFill>
+              <a:schemeClr val="accent1"/>
+            </a:solidFill>
+            <a:headEnd type="arrow" w="med" len="med"/>
+            <a:tailEnd type="arrow" w="med" len="med"/>
           </a:ln>
         </p:spPr>
         <p:style>
@@ -12143,7 +12154,7 @@
           <a:lstStyle/>
           <a:p>
             <a:r>
-              <a:rPr kumimoji="1" lang="en-US" altLang="ja-JP" dirty="0" smtClean="0"/>
+              <a:rPr kumimoji="1" lang="en-US" altLang="ja-JP" dirty="0"/>
               <a:t>Edge Device</a:t>
             </a:r>
             <a:endParaRPr kumimoji="1" lang="ja-JP" altLang="en-US" dirty="0"/>
@@ -12230,14 +12241,18 @@
         </p:nvCxnSpPr>
         <p:spPr>
           <a:xfrm flipH="1">
-            <a:off x="3347864" y="3284984"/>
+            <a:off x="3347864" y="3356992"/>
             <a:ext cx="504056" cy="360040"/>
           </a:xfrm>
           <a:prstGeom prst="straightConnector1">
             <a:avLst/>
           </a:prstGeom>
           <a:ln>
-            <a:tailEnd type="arrow"/>
+            <a:solidFill>
+              <a:schemeClr val="accent1"/>
+            </a:solidFill>
+            <a:headEnd type="arrow" w="med" len="med"/>
+            <a:tailEnd type="arrow" w="med" len="med"/>
           </a:ln>
         </p:spPr>
         <p:style>
@@ -12260,7 +12275,7 @@
           <p:cNvPr id="12" name="テキスト ボックス 18">
             <a:extLst>
               <a:ext uri="{FF2B5EF4-FFF2-40B4-BE49-F238E27FC236}">
-                <a16:creationId xmlns:a16="http://schemas.microsoft.com/office/drawing/2014/main" xmlns="" id="{A8D79E22-D110-A944-A474-A42156233C3E}"/>
+                <a16:creationId xmlns:a16="http://schemas.microsoft.com/office/drawing/2014/main" id="{A8D79E22-D110-A944-A474-A42156233C3E}"/>
               </a:ext>
             </a:extLst>
           </p:cNvPr>
@@ -12313,7 +12328,7 @@
         </p:blipFill>
         <p:spPr bwMode="auto">
           <a:xfrm>
-            <a:off x="3707904" y="3861048"/>
+            <a:off x="3707904" y="3918299"/>
             <a:ext cx="248558" cy="518813"/>
           </a:xfrm>
           <a:prstGeom prst="rect">
@@ -12325,14 +12340,14 @@
           </a:ln>
           <a:extLst>
             <a:ext uri="{909E8E84-426E-40dd-AFC4-6F175D3DCCD1}">
-              <a14:hiddenFill xmlns:a14="http://schemas.microsoft.com/office/drawing/2010/main">
+              <a14:hiddenFill xmlns:a14="http://schemas.microsoft.com/office/drawing/2010/main" xmlns="">
                 <a:solidFill>
                   <a:schemeClr val="accent1"/>
                 </a:solidFill>
               </a14:hiddenFill>
             </a:ext>
             <a:ext uri="{91240B29-F687-4f45-9708-019B960494DF}">
-              <a14:hiddenLine xmlns:a14="http://schemas.microsoft.com/office/drawing/2010/main" w="9525">
+              <a14:hiddenLine xmlns:a14="http://schemas.microsoft.com/office/drawing/2010/main" xmlns="" w="9525">
                 <a:solidFill>
                   <a:schemeClr val="tx1"/>
                 </a:solidFill>
@@ -12376,7 +12391,7 @@
           <a:noFill/>
           <a:extLst>
             <a:ext uri="{909E8E84-426E-40dd-AFC4-6F175D3DCCD1}">
-              <a14:hiddenFill xmlns:a14="http://schemas.microsoft.com/office/drawing/2010/main">
+              <a14:hiddenFill xmlns:a14="http://schemas.microsoft.com/office/drawing/2010/main" xmlns="">
                 <a:solidFill>
                   <a:srgbClr val="FFFFFF"/>
                 </a:solidFill>
@@ -12389,20 +12404,21 @@
         <p:nvCxnSpPr>
           <p:cNvPr id="18" name="直線矢印コネクタ 17"/>
           <p:cNvCxnSpPr>
-            <a:endCxn id="13" idx="0"/>
+            <a:cxnSpLocks/>
           </p:cNvCxnSpPr>
           <p:nvPr/>
         </p:nvCxnSpPr>
         <p:spPr>
           <a:xfrm flipH="1">
-            <a:off x="3832183" y="3284984"/>
+            <a:off x="3832183" y="3356992"/>
             <a:ext cx="91745" cy="576064"/>
           </a:xfrm>
           <a:prstGeom prst="straightConnector1">
             <a:avLst/>
           </a:prstGeom>
           <a:ln>
-            <a:tailEnd type="arrow"/>
+            <a:headEnd type="arrow" w="med" len="med"/>
+            <a:tailEnd type="none" w="med" len="med"/>
           </a:ln>
         </p:spPr>
         <p:style>
@@ -12428,7 +12444,7 @@
         </p:nvCxnSpPr>
         <p:spPr>
           <a:xfrm flipH="1">
-            <a:off x="2627784" y="3284984"/>
+            <a:off x="2555776" y="3284984"/>
             <a:ext cx="1296144" cy="216024"/>
           </a:xfrm>
           <a:prstGeom prst="straightConnector1">
@@ -12709,7 +12725,8 @@
             <a:avLst/>
           </a:prstGeom>
           <a:ln>
-            <a:tailEnd type="arrow"/>
+            <a:headEnd type="arrow" w="med" len="med"/>
+            <a:tailEnd type="arrow" w="med" len="med"/>
           </a:ln>
         </p:spPr>
         <p:style>
@@ -12915,7 +12932,7 @@
           <p:cNvPr id="15" name="テキスト ボックス 18">
             <a:extLst>
               <a:ext uri="{FF2B5EF4-FFF2-40B4-BE49-F238E27FC236}">
-                <a16:creationId xmlns:a16="http://schemas.microsoft.com/office/drawing/2014/main" xmlns="" id="{AFE42B18-28B9-9245-A082-17E76DDF5446}"/>
+                <a16:creationId xmlns:a16="http://schemas.microsoft.com/office/drawing/2014/main" id="{AFE42B18-28B9-9245-A082-17E76DDF5446}"/>
               </a:ext>
             </a:extLst>
           </p:cNvPr>
@@ -13409,7 +13426,7 @@
           <p:cNvPr id="15" name="テキスト ボックス 18">
             <a:extLst>
               <a:ext uri="{FF2B5EF4-FFF2-40B4-BE49-F238E27FC236}">
-                <a16:creationId xmlns:a16="http://schemas.microsoft.com/office/drawing/2014/main" xmlns="" id="{AFE42B18-28B9-9245-A082-17E76DDF5446}"/>
+                <a16:creationId xmlns:a16="http://schemas.microsoft.com/office/drawing/2014/main" id="{AFE42B18-28B9-9245-A082-17E76DDF5446}"/>
               </a:ext>
             </a:extLst>
           </p:cNvPr>
@@ -13697,7 +13714,8 @@
             <a:avLst/>
           </a:prstGeom>
           <a:ln>
-            <a:tailEnd type="arrow"/>
+            <a:headEnd type="arrow" w="med" len="med"/>
+            <a:tailEnd type="arrow" w="med" len="med"/>
           </a:ln>
         </p:spPr>
         <p:style>
@@ -13968,7 +13986,11 @@
             <a:avLst/>
           </a:prstGeom>
           <a:ln>
-            <a:tailEnd type="arrow"/>
+            <a:solidFill>
+              <a:schemeClr val="accent1"/>
+            </a:solidFill>
+            <a:headEnd type="arrow" w="med" len="med"/>
+            <a:tailEnd type="arrow" w="med" len="med"/>
           </a:ln>
         </p:spPr>
         <p:style>
@@ -13991,7 +14013,7 @@
           <p:cNvPr id="20" name="テキスト ボックス 18">
             <a:extLst>
               <a:ext uri="{FF2B5EF4-FFF2-40B4-BE49-F238E27FC236}">
-                <a16:creationId xmlns:a16="http://schemas.microsoft.com/office/drawing/2014/main" xmlns="" id="{1BABC55C-975E-6846-985C-88584B52D21F}"/>
+                <a16:creationId xmlns:a16="http://schemas.microsoft.com/office/drawing/2014/main" id="{1BABC55C-975E-6846-985C-88584B52D21F}"/>
               </a:ext>
             </a:extLst>
           </p:cNvPr>
@@ -14279,7 +14301,8 @@
             <a:avLst/>
           </a:prstGeom>
           <a:ln>
-            <a:tailEnd type="arrow"/>
+            <a:headEnd type="arrow" w="med" len="med"/>
+            <a:tailEnd type="arrow" w="med" len="med"/>
           </a:ln>
         </p:spPr>
         <p:style>
@@ -14550,7 +14573,11 @@
             <a:avLst/>
           </a:prstGeom>
           <a:ln>
-            <a:tailEnd type="arrow"/>
+            <a:solidFill>
+              <a:schemeClr val="accent1"/>
+            </a:solidFill>
+            <a:headEnd type="arrow" w="med" len="med"/>
+            <a:tailEnd type="arrow" w="med" len="med"/>
           </a:ln>
         </p:spPr>
         <p:style>
@@ -14573,7 +14600,7 @@
           <p:cNvPr id="20" name="テキスト ボックス 18">
             <a:extLst>
               <a:ext uri="{FF2B5EF4-FFF2-40B4-BE49-F238E27FC236}">
-                <a16:creationId xmlns:a16="http://schemas.microsoft.com/office/drawing/2014/main" xmlns="" id="{1BABC55C-975E-6846-985C-88584B52D21F}"/>
+                <a16:creationId xmlns:a16="http://schemas.microsoft.com/office/drawing/2014/main" id="{1BABC55C-975E-6846-985C-88584B52D21F}"/>
               </a:ext>
             </a:extLst>
           </p:cNvPr>

</xml_diff>